<commit_message>
Update date and instructor name on slides & index page
</commit_message>
<xml_diff>
--- a/Slides/MiCM_IntroToR.pptx
+++ b/Slides/MiCM_IntroToR.pptx
@@ -2414,7 +2414,7 @@
           <a:p>
             <a:fld id="{217E5156-1B5D-054E-B5B2-E1B1BA160252}" type="datetimeFigureOut">
               <a:rPr lang="fr-FR" smtClean="0"/>
-              <a:t>04/02/2026</a:t>
+              <a:t>13/02/2026</a:t>
             </a:fld>
             <a:endParaRPr lang="fr-FR"/>
           </a:p>
@@ -11516,7 +11516,7 @@
                   <a:srgbClr val="69B0A0"/>
                 </a:solidFill>
               </a:rPr>
-              <a:t>Facilitator: Maria Haddad</a:t>
+              <a:t>Facilitator: Sameena Karsan</a:t>
             </a:r>
             <a:br>
               <a:rPr lang="en-CA" sz="6600" dirty="0">
@@ -11530,7 +11530,7 @@
             </a:br>
             <a:r>
               <a:rPr lang="en-CA" sz="2200" dirty="0"/>
-              <a:t>Feb 9, 2026</a:t>
+              <a:t>Feb 16, 2026</a:t>
             </a:r>
             <a:br>
               <a:rPr lang="en-CA" sz="2200" dirty="0"/>
@@ -19976,7 +19976,7 @@
           <a:p>
             <a:pPr algn="ctr"/>
             <a:r>
-              <a:rPr lang="en-CA">
+              <a:rPr lang="en-CA" dirty="0">
                 <a:latin typeface="Helvetica" pitchFamily="2" charset="0"/>
               </a:rPr>
               <a:t>Thank you for attending!</a:t>
@@ -19998,8 +19998,8 @@
         </p:nvSpPr>
         <p:spPr>
           <a:xfrm>
-            <a:off x="540553" y="5081109"/>
-            <a:ext cx="2236304" cy="830997"/>
+            <a:off x="3773908" y="2305615"/>
+            <a:ext cx="4741442" cy="2246769"/>
           </a:xfrm>
           <a:prstGeom prst="rect">
             <a:avLst/>
@@ -20014,366 +20014,17 @@
           <a:p>
             <a:pPr marL="9525" lvl="1" algn="ctr"/>
             <a:r>
-              <a:rPr lang="en-CA" sz="1600">
+              <a:rPr lang="en-CA" sz="2800" dirty="0">
                 <a:latin typeface="Helvetica" pitchFamily="2" charset="0"/>
               </a:rPr>
-              <a:t>Scan the QR code to confirm you attended today’s workshop.</a:t>
-            </a:r>
-          </a:p>
-        </p:txBody>
-      </p:sp>
-      <p:sp>
-        <p:nvSpPr>
-          <p:cNvPr id="6" name="TextBox 5">
-            <a:extLst>
-              <a:ext uri="{FF2B5EF4-FFF2-40B4-BE49-F238E27FC236}">
-                <a16:creationId xmlns:a16="http://schemas.microsoft.com/office/drawing/2014/main" id="{B779A3F8-F204-0C4B-8C60-EB9078FAF391}"/>
-              </a:ext>
-            </a:extLst>
-          </p:cNvPr>
-          <p:cNvSpPr txBox="1"/>
-          <p:nvPr/>
-        </p:nvSpPr>
-        <p:spPr>
-          <a:xfrm>
-            <a:off x="3555521" y="5087164"/>
-            <a:ext cx="1866473" cy="830997"/>
-          </a:xfrm>
-          <a:prstGeom prst="rect">
-            <a:avLst/>
-          </a:prstGeom>
-          <a:noFill/>
-        </p:spPr>
-        <p:txBody>
-          <a:bodyPr wrap="square">
-            <a:spAutoFit/>
-          </a:bodyPr>
-          <a:lstStyle/>
-          <a:p>
-            <a:pPr algn="ctr"/>
-            <a:r>
-              <a:rPr lang="en-CA" sz="1600">
-                <a:latin typeface="Helvetica" pitchFamily="2" charset="0"/>
-              </a:rPr>
-              <a:t>Fill out the feedback survey in the next 72h. </a:t>
-            </a:r>
-          </a:p>
-        </p:txBody>
-      </p:sp>
-      <p:sp>
-        <p:nvSpPr>
-          <p:cNvPr id="7" name="TextBox 6">
-            <a:extLst>
-              <a:ext uri="{FF2B5EF4-FFF2-40B4-BE49-F238E27FC236}">
-                <a16:creationId xmlns:a16="http://schemas.microsoft.com/office/drawing/2014/main" id="{5B857086-E9A2-1558-824A-80776B62AF2C}"/>
-              </a:ext>
-            </a:extLst>
-          </p:cNvPr>
-          <p:cNvSpPr txBox="1"/>
-          <p:nvPr/>
-        </p:nvSpPr>
-        <p:spPr>
-          <a:xfrm>
-            <a:off x="5970821" y="5081109"/>
-            <a:ext cx="2695988" cy="830997"/>
-          </a:xfrm>
-          <a:prstGeom prst="rect">
-            <a:avLst/>
-          </a:prstGeom>
-          <a:noFill/>
-        </p:spPr>
-        <p:txBody>
-          <a:bodyPr wrap="square">
-            <a:spAutoFit/>
-          </a:bodyPr>
-          <a:lstStyle/>
-          <a:p>
-            <a:pPr algn="ctr"/>
-            <a:r>
-              <a:rPr lang="en-CA" sz="1600">
-                <a:latin typeface="Helvetica" pitchFamily="2" charset="0"/>
-              </a:rPr>
-              <a:t>Get recognition for this workshop on your </a:t>
-            </a:r>
-          </a:p>
-          <a:p>
-            <a:pPr algn="ctr"/>
-            <a:r>
-              <a:rPr lang="en-CA" sz="1600">
-                <a:latin typeface="Helvetica" pitchFamily="2" charset="0"/>
-              </a:rPr>
-              <a:t>co-curricular record. </a:t>
-            </a:r>
-          </a:p>
-        </p:txBody>
-      </p:sp>
-      <p:sp>
-        <p:nvSpPr>
-          <p:cNvPr id="10" name="Oval 9">
-            <a:extLst>
-              <a:ext uri="{FF2B5EF4-FFF2-40B4-BE49-F238E27FC236}">
-                <a16:creationId xmlns:a16="http://schemas.microsoft.com/office/drawing/2014/main" id="{41CD90ED-F12C-DA32-1A84-EF0356FB7921}"/>
-              </a:ext>
-            </a:extLst>
-          </p:cNvPr>
-          <p:cNvSpPr>
-            <a:spLocks noChangeAspect="1"/>
-          </p:cNvSpPr>
-          <p:nvPr/>
-        </p:nvSpPr>
-        <p:spPr>
-          <a:xfrm>
-            <a:off x="1298705" y="1853639"/>
-            <a:ext cx="720000" cy="686283"/>
-          </a:xfrm>
-          <a:prstGeom prst="ellipse">
-            <a:avLst/>
-          </a:prstGeom>
-          <a:solidFill>
-            <a:srgbClr val="13A89E">
-              <a:alpha val="49412"/>
-            </a:srgbClr>
-          </a:solidFill>
-          <a:ln>
-            <a:noFill/>
-          </a:ln>
-        </p:spPr>
-        <p:style>
-          <a:lnRef idx="2">
-            <a:schemeClr val="accent1">
-              <a:shade val="15000"/>
-            </a:schemeClr>
-          </a:lnRef>
-          <a:fillRef idx="1">
-            <a:schemeClr val="accent1"/>
-          </a:fillRef>
-          <a:effectRef idx="0">
-            <a:schemeClr val="accent1"/>
-          </a:effectRef>
-          <a:fontRef idx="minor">
-            <a:schemeClr val="lt1"/>
-          </a:fontRef>
-        </p:style>
-        <p:txBody>
-          <a:bodyPr rtlCol="0" anchor="ctr"/>
-          <a:lstStyle/>
-          <a:p>
-            <a:pPr algn="ctr"/>
-            <a:r>
-              <a:rPr lang="en-US">
-                <a:latin typeface="Helvetica" pitchFamily="2" charset="0"/>
-              </a:rPr>
-              <a:t>1</a:t>
-            </a:r>
-          </a:p>
-        </p:txBody>
-      </p:sp>
-      <p:sp>
-        <p:nvSpPr>
-          <p:cNvPr id="11" name="Oval 10">
-            <a:extLst>
-              <a:ext uri="{FF2B5EF4-FFF2-40B4-BE49-F238E27FC236}">
-                <a16:creationId xmlns:a16="http://schemas.microsoft.com/office/drawing/2014/main" id="{1B79FEFC-04D4-EE23-8047-B09F61F389B0}"/>
-              </a:ext>
-            </a:extLst>
-          </p:cNvPr>
-          <p:cNvSpPr>
-            <a:spLocks noChangeAspect="1"/>
-          </p:cNvSpPr>
-          <p:nvPr/>
-        </p:nvSpPr>
-        <p:spPr>
-          <a:xfrm>
-            <a:off x="4128760" y="1853639"/>
-            <a:ext cx="720000" cy="686283"/>
-          </a:xfrm>
-          <a:prstGeom prst="ellipse">
-            <a:avLst/>
-          </a:prstGeom>
-          <a:solidFill>
-            <a:srgbClr val="13A89E">
-              <a:alpha val="74902"/>
-            </a:srgbClr>
-          </a:solidFill>
-          <a:ln>
-            <a:noFill/>
-          </a:ln>
-        </p:spPr>
-        <p:style>
-          <a:lnRef idx="2">
-            <a:schemeClr val="accent1">
-              <a:shade val="15000"/>
-            </a:schemeClr>
-          </a:lnRef>
-          <a:fillRef idx="1">
-            <a:schemeClr val="accent1"/>
-          </a:fillRef>
-          <a:effectRef idx="0">
-            <a:schemeClr val="accent1"/>
-          </a:effectRef>
-          <a:fontRef idx="minor">
-            <a:schemeClr val="lt1"/>
-          </a:fontRef>
-        </p:style>
-        <p:txBody>
-          <a:bodyPr rtlCol="0" anchor="ctr"/>
-          <a:lstStyle/>
-          <a:p>
-            <a:pPr algn="ctr"/>
-            <a:r>
-              <a:rPr lang="en-US">
-                <a:latin typeface="Helvetica" pitchFamily="2" charset="0"/>
-              </a:rPr>
-              <a:t>2</a:t>
-            </a:r>
-          </a:p>
-        </p:txBody>
-      </p:sp>
-      <p:sp>
-        <p:nvSpPr>
-          <p:cNvPr id="12" name="Oval 11">
-            <a:extLst>
-              <a:ext uri="{FF2B5EF4-FFF2-40B4-BE49-F238E27FC236}">
-                <a16:creationId xmlns:a16="http://schemas.microsoft.com/office/drawing/2014/main" id="{B755A2CE-36C7-7C3A-E3EF-94EBD356F86C}"/>
-              </a:ext>
-            </a:extLst>
-          </p:cNvPr>
-          <p:cNvSpPr>
-            <a:spLocks noChangeAspect="1"/>
-          </p:cNvSpPr>
-          <p:nvPr/>
-        </p:nvSpPr>
-        <p:spPr>
-          <a:xfrm>
-            <a:off x="6958815" y="1837130"/>
-            <a:ext cx="720000" cy="686283"/>
-          </a:xfrm>
-          <a:prstGeom prst="ellipse">
-            <a:avLst/>
-          </a:prstGeom>
-          <a:solidFill>
-            <a:srgbClr val="13A89E"/>
-          </a:solidFill>
-          <a:ln>
-            <a:noFill/>
-          </a:ln>
-        </p:spPr>
-        <p:style>
-          <a:lnRef idx="2">
-            <a:schemeClr val="accent1">
-              <a:shade val="15000"/>
-            </a:schemeClr>
-          </a:lnRef>
-          <a:fillRef idx="1">
-            <a:schemeClr val="accent1"/>
-          </a:fillRef>
-          <a:effectRef idx="0">
-            <a:schemeClr val="accent1"/>
-          </a:effectRef>
-          <a:fontRef idx="minor">
-            <a:schemeClr val="lt1"/>
-          </a:fontRef>
-        </p:style>
-        <p:txBody>
-          <a:bodyPr rtlCol="0" anchor="ctr"/>
-          <a:lstStyle/>
-          <a:p>
-            <a:pPr algn="ctr"/>
-            <a:r>
-              <a:rPr lang="en-US">
-                <a:latin typeface="Helvetica" pitchFamily="2" charset="0"/>
-              </a:rPr>
-              <a:t>3</a:t>
+              <a:t>Scan the QR code to complete the feedback survey and share your suggestions or comments about today’s workshop</a:t>
             </a:r>
           </a:p>
         </p:txBody>
       </p:sp>
       <p:pic>
         <p:nvPicPr>
-          <p:cNvPr id="14" name="Graphic 13" descr="Clipboard with solid fill">
-            <a:extLst>
-              <a:ext uri="{FF2B5EF4-FFF2-40B4-BE49-F238E27FC236}">
-                <a16:creationId xmlns:a16="http://schemas.microsoft.com/office/drawing/2014/main" id="{060FE140-39DA-6155-D659-8C3C8FEDECAE}"/>
-              </a:ext>
-            </a:extLst>
-          </p:cNvPr>
-          <p:cNvPicPr>
-            <a:picLocks noChangeAspect="1"/>
-          </p:cNvPicPr>
-          <p:nvPr/>
-        </p:nvPicPr>
-        <p:blipFill>
-          <a:blip r:embed="rId2">
-            <a:extLst>
-              <a:ext uri="{96DAC541-7B7A-43D3-8B79-37D633B846F1}">
-                <asvg:svgBlip xmlns:asvg="http://schemas.microsoft.com/office/drawing/2016/SVG/main" r:embed="rId3"/>
-              </a:ext>
-            </a:extLst>
-          </a:blip>
-          <a:stretch>
-            <a:fillRect/>
-          </a:stretch>
-        </p:blipFill>
-        <p:spPr>
-          <a:xfrm>
-            <a:off x="3555521" y="2880306"/>
-            <a:ext cx="1866473" cy="1866473"/>
-          </a:xfrm>
-          <a:prstGeom prst="rect">
-            <a:avLst/>
-          </a:prstGeom>
-        </p:spPr>
-      </p:pic>
-      <p:pic>
-        <p:nvPicPr>
-          <p:cNvPr id="1026" name="Picture 2" descr="Co-curricular record approval logo">
-            <a:extLst>
-              <a:ext uri="{FF2B5EF4-FFF2-40B4-BE49-F238E27FC236}">
-                <a16:creationId xmlns:a16="http://schemas.microsoft.com/office/drawing/2014/main" id="{B21C3CDD-B849-1F66-A5B6-38B78BCAB0B1}"/>
-              </a:ext>
-            </a:extLst>
-          </p:cNvPr>
-          <p:cNvPicPr>
-            <a:picLocks noChangeAspect="1" noChangeArrowheads="1"/>
-          </p:cNvPicPr>
-          <p:nvPr/>
-        </p:nvPicPr>
-        <p:blipFill>
-          <a:blip r:embed="rId4">
-            <a:extLst>
-              <a:ext uri="{28A0092B-C50C-407E-A947-70E740481C1C}">
-                <a14:useLocalDpi xmlns:a14="http://schemas.microsoft.com/office/drawing/2010/main" val="0"/>
-              </a:ext>
-            </a:extLst>
-          </a:blip>
-          <a:srcRect/>
-          <a:stretch>
-            <a:fillRect/>
-          </a:stretch>
-        </p:blipFill>
-        <p:spPr bwMode="auto">
-          <a:xfrm>
-            <a:off x="6302815" y="3051542"/>
-            <a:ext cx="2032000" cy="1524000"/>
-          </a:xfrm>
-          <a:prstGeom prst="rect">
-            <a:avLst/>
-          </a:prstGeom>
-          <a:noFill/>
-          <a:extLst>
-            <a:ext uri="{909E8E84-426E-40DD-AFC4-6F175D3DCCD1}">
-              <a14:hiddenFill xmlns:a14="http://schemas.microsoft.com/office/drawing/2010/main">
-                <a:solidFill>
-                  <a:srgbClr val="FFFFFF"/>
-                </a:solidFill>
-              </a14:hiddenFill>
-            </a:ext>
-          </a:extLst>
-        </p:spPr>
-      </p:pic>
-      <p:pic>
-        <p:nvPicPr>
-          <p:cNvPr id="8" name="Picture 7" descr="A qr code with black squares&#10;&#10;AI-generated content may be incorrect.">
+          <p:cNvPr id="8" name="Picture 7">
             <a:extLst>
               <a:ext uri="{FF2B5EF4-FFF2-40B4-BE49-F238E27FC236}">
                 <a16:creationId xmlns:a16="http://schemas.microsoft.com/office/drawing/2014/main" id="{10EBFE33-8C8A-8497-204A-F4A1B0943CFE}"/>
@@ -20386,14 +20037,13 @@
           <p:nvPr/>
         </p:nvPicPr>
         <p:blipFill>
-          <a:blip r:embed="rId5"/>
-          <a:stretch>
-            <a:fillRect/>
-          </a:stretch>
+          <a:blip r:embed="rId2"/>
+          <a:srcRect/>
+          <a:stretch/>
         </p:blipFill>
         <p:spPr>
           <a:xfrm>
-            <a:off x="628650" y="2702873"/>
+            <a:off x="1185241" y="2363765"/>
             <a:ext cx="2188619" cy="2188619"/>
           </a:xfrm>
           <a:prstGeom prst="rect">

</xml_diff>